<commit_message>
Layout Of First Slide Modified
</commit_message>
<xml_diff>
--- a/Slides/20486Core_00.pptx
+++ b/Slides/20486Core_00.pptx
@@ -248,7 +248,7 @@
             <a:fld id="{865CA2D4-094E-48F7-9E06-42143F59D099}" type="datetimeFigureOut">
               <a:rPr lang="en-US" smtClean="0"/>
               <a:pPr/>
-              <a:t>12/15/2016</a:t>
+              <a:t>12/20/2016</a:t>
             </a:fld>
             <a:endParaRPr lang="en-US" dirty="0"/>
           </a:p>
@@ -415,7 +415,7 @@
             <a:fld id="{E467C250-A218-43FB-AD95-3331D2A81DF1}" type="datetimeFigureOut">
               <a:rPr lang="en-US" smtClean="0"/>
               <a:pPr/>
-              <a:t>12/15/2016</a:t>
+              <a:t>12/20/2016</a:t>
             </a:fld>
             <a:endParaRPr lang="en-US" dirty="0"/>
           </a:p>
@@ -3489,7 +3489,7 @@
             <a:fld id="{FC69B7DB-8367-4EA5-BD31-DC3A1C807884}" type="datetimeFigureOut">
               <a:rPr lang="en-US" smtClean="0"/>
               <a:pPr/>
-              <a:t>12/15/2016</a:t>
+              <a:t>12/20/2016</a:t>
             </a:fld>
             <a:endParaRPr lang="en-US" dirty="0"/>
           </a:p>
@@ -3865,85 +3865,82 @@
       </p:grpSpPr>
       <p:sp>
         <p:nvSpPr>
+          <p:cNvPr id="4" name="Title 3"/>
+          <p:cNvSpPr>
+            <a:spLocks noGrp="1"/>
+          </p:cNvSpPr>
+          <p:nvPr>
+            <p:ph type="title"/>
+          </p:nvPr>
+        </p:nvSpPr>
+        <p:spPr/>
+        <p:txBody>
+          <a:bodyPr/>
+          <a:lstStyle/>
+          <a:p>
+            <a:endParaRPr lang="nl-NL" dirty="0"/>
+          </a:p>
+        </p:txBody>
+      </p:sp>
+      <p:sp>
+        <p:nvSpPr>
           <p:cNvPr id="7" name="Text Placeholder 6"/>
           <p:cNvSpPr>
             <a:spLocks noGrp="1"/>
           </p:cNvSpPr>
           <p:nvPr>
-            <p:ph type="body" sz="quarter" idx="11"/>
+            <p:ph type="body" sz="quarter" idx="4294967295"/>
           </p:nvPr>
         </p:nvSpPr>
         <p:spPr>
           <a:xfrm>
-            <a:off x="3124199" y="2590800"/>
-            <a:ext cx="5622833" cy="2438400"/>
-          </a:xfrm>
-        </p:spPr>
-        <p:txBody>
-          <a:bodyPr/>
-          <a:lstStyle/>
-          <a:p>
-            <a:r>
-              <a:rPr lang="en-US" sz="4400" dirty="0" smtClean="0"/>
-              <a:t>Developing ASP.NET MVC </a:t>
-            </a:r>
-            <a:r>
-              <a:rPr lang="en-US" sz="4400" dirty="0" smtClean="0"/>
-              <a:t>Core </a:t>
-            </a:r>
-            <a:r>
-              <a:rPr lang="en-US" sz="4400" dirty="0" smtClean="0"/>
-              <a:t>Web Applications</a:t>
-            </a:r>
-            <a:endParaRPr lang="en-US" sz="4400" dirty="0"/>
-          </a:p>
-        </p:txBody>
-      </p:sp>
-      <p:sp>
-        <p:nvSpPr>
-          <p:cNvPr id="2" name="Rectangle 1"/>
-          <p:cNvSpPr/>
-          <p:nvPr/>
-        </p:nvSpPr>
-        <p:spPr>
-          <a:xfrm>
-            <a:off x="228600" y="838200"/>
-            <a:ext cx="7467600" cy="1524000"/>
+            <a:off x="0" y="1066800"/>
+            <a:ext cx="9144000" cy="5105400"/>
           </a:xfrm>
           <a:prstGeom prst="rect">
             <a:avLst/>
           </a:prstGeom>
-          <a:solidFill>
-            <a:schemeClr val="bg1"/>
-          </a:solidFill>
-          <a:ln>
-            <a:solidFill>
-              <a:schemeClr val="bg1"/>
-            </a:solidFill>
-          </a:ln>
         </p:spPr>
-        <p:style>
-          <a:lnRef idx="2">
-            <a:schemeClr val="accent1">
-              <a:shade val="50000"/>
-            </a:schemeClr>
-          </a:lnRef>
-          <a:fillRef idx="1">
-            <a:schemeClr val="accent1"/>
-          </a:fillRef>
-          <a:effectRef idx="0">
-            <a:schemeClr val="accent1"/>
-          </a:effectRef>
-          <a:fontRef idx="minor">
-            <a:schemeClr val="lt1"/>
-          </a:fontRef>
-        </p:style>
-        <p:txBody>
-          <a:bodyPr rtlCol="0" anchor="ctr"/>
-          <a:lstStyle/>
-          <a:p>
-            <a:pPr algn="ctr"/>
-            <a:endParaRPr lang="nl-NL"/>
+        <p:txBody>
+          <a:bodyPr anchor="ctr"/>
+          <a:lstStyle/>
+          <a:p>
+            <a:pPr marL="0" indent="0" algn="ctr">
+              <a:buNone/>
+            </a:pPr>
+            <a:r>
+              <a:rPr lang="en-US" sz="4400" dirty="0" smtClean="0"/>
+              <a:t>Developing </a:t>
+            </a:r>
+            <a:endParaRPr lang="en-US" sz="4400" dirty="0" smtClean="0"/>
+          </a:p>
+          <a:p>
+            <a:pPr marL="0" indent="0" algn="ctr">
+              <a:buNone/>
+            </a:pPr>
+            <a:r>
+              <a:rPr lang="en-US" sz="4400" dirty="0" smtClean="0"/>
+              <a:t>ASP.NET </a:t>
+            </a:r>
+            <a:r>
+              <a:rPr lang="en-US" sz="4400" dirty="0" smtClean="0"/>
+              <a:t>MVC Core </a:t>
+            </a:r>
+            <a:endParaRPr lang="en-US" sz="4400" dirty="0" smtClean="0"/>
+          </a:p>
+          <a:p>
+            <a:pPr marL="0" indent="0" algn="ctr">
+              <a:buNone/>
+            </a:pPr>
+            <a:r>
+              <a:rPr lang="en-US" sz="4400" dirty="0" smtClean="0"/>
+              <a:t>Web </a:t>
+            </a:r>
+            <a:r>
+              <a:rPr lang="en-US" sz="4400" dirty="0" smtClean="0"/>
+              <a:t>Applications</a:t>
+            </a:r>
+            <a:endParaRPr lang="en-US" sz="4400" dirty="0"/>
           </a:p>
         </p:txBody>
       </p:sp>
@@ -4061,15 +4058,7 @@
             </a:r>
             <a:r>
               <a:rPr lang="en-US" sz="2400" dirty="0" smtClean="0"/>
-              <a:t>9: Building Responsive Pages in ASP.NET MVC </a:t>
-            </a:r>
-            <a:r>
-              <a:rPr lang="en-US" sz="2400" dirty="0" smtClean="0"/>
-              <a:t>Core </a:t>
-            </a:r>
-            <a:r>
-              <a:rPr lang="en-US" sz="2400" dirty="0" smtClean="0"/>
-              <a:t>Web Applications</a:t>
+              <a:t>9: Building Responsive Pages in ASP.NET MVC Core Web Applications</a:t>
             </a:r>
             <a:endParaRPr lang="en-US" sz="2400" dirty="0"/>
           </a:p>
@@ -4085,15 +4074,7 @@
             </a:r>
             <a:r>
               <a:rPr lang="en-US" sz="2400" dirty="0" smtClean="0"/>
-              <a:t>10: Using JavaScript and jQuery for Responsive MVC </a:t>
-            </a:r>
-            <a:r>
-              <a:rPr lang="en-US" sz="2400" dirty="0" smtClean="0"/>
-              <a:t>Core </a:t>
-            </a:r>
-            <a:r>
-              <a:rPr lang="en-US" sz="2400" dirty="0" smtClean="0"/>
-              <a:t>Web Applications</a:t>
+              <a:t>10: Using JavaScript and jQuery for Responsive MVC Core Web Applications</a:t>
             </a:r>
             <a:endParaRPr lang="en-US" sz="2400" dirty="0"/>
           </a:p>
@@ -4109,15 +4090,7 @@
             </a:r>
             <a:r>
               <a:rPr lang="en-US" sz="2400" dirty="0" smtClean="0"/>
-              <a:t>11: Controlling Access to ASP.NET MVC </a:t>
-            </a:r>
-            <a:r>
-              <a:rPr lang="en-US" sz="2400" dirty="0" smtClean="0"/>
-              <a:t>Core </a:t>
-            </a:r>
-            <a:r>
-              <a:rPr lang="en-US" sz="2400" dirty="0" smtClean="0"/>
-              <a:t>Web Applications</a:t>
+              <a:t>11: Controlling Access to ASP.NET MVC Core Web Applications</a:t>
             </a:r>
             <a:endParaRPr lang="en-US" sz="2400" dirty="0"/>
           </a:p>
@@ -4133,15 +4106,7 @@
             </a:r>
             <a:r>
               <a:rPr lang="en-US" sz="2400" dirty="0" smtClean="0"/>
-              <a:t>12: Building a Resilient ASP.NET MVC </a:t>
-            </a:r>
-            <a:r>
-              <a:rPr lang="en-US" sz="2400" dirty="0" smtClean="0"/>
-              <a:t>Core </a:t>
-            </a:r>
-            <a:r>
-              <a:rPr lang="en-US" sz="2400" dirty="0" smtClean="0"/>
-              <a:t>Web Application</a:t>
+              <a:t>12: Building a Resilient ASP.NET MVC Core Web Application</a:t>
             </a:r>
             <a:endParaRPr lang="en-US" sz="2400" dirty="0"/>
           </a:p>
@@ -4157,15 +4122,7 @@
             </a:r>
             <a:r>
               <a:rPr lang="en-US" sz="2400" dirty="0" smtClean="0"/>
-              <a:t>13: Using Windows Azure Web Services in ASP.NET MVC </a:t>
-            </a:r>
-            <a:r>
-              <a:rPr lang="en-US" sz="2400" dirty="0" smtClean="0"/>
-              <a:t>Core </a:t>
-            </a:r>
-            <a:r>
-              <a:rPr lang="en-US" sz="2400" dirty="0" smtClean="0"/>
-              <a:t>Web Applications</a:t>
+              <a:t>13: Using Windows Azure Web Services in ASP.NET MVC Core Web Applications</a:t>
             </a:r>
           </a:p>
         </p:txBody>
@@ -4273,15 +4230,7 @@
             </a:pPr>
             <a:r>
               <a:rPr lang="en-US" sz="2400" dirty="0" smtClean="0"/>
-              <a:t>Module 14: Implementing Web APIs in ASP.NET MVC </a:t>
-            </a:r>
-            <a:r>
-              <a:rPr lang="en-US" sz="2400" dirty="0" smtClean="0"/>
-              <a:t>Core </a:t>
-            </a:r>
-            <a:r>
-              <a:rPr lang="en-US" sz="2400" dirty="0" smtClean="0"/>
-              <a:t>Web Applications</a:t>
+              <a:t>Module 14: Implementing Web APIs in ASP.NET MVC Core Web Applications</a:t>
             </a:r>
           </a:p>
           <a:p>
@@ -4292,15 +4241,7 @@
             </a:pPr>
             <a:r>
               <a:rPr lang="en-US" sz="2400" dirty="0" smtClean="0"/>
-              <a:t>Module 15: Handling Requests in ASP.NET MVC </a:t>
-            </a:r>
-            <a:r>
-              <a:rPr lang="en-US" sz="2400" dirty="0" smtClean="0"/>
-              <a:t>Core </a:t>
-            </a:r>
-            <a:r>
-              <a:rPr lang="en-US" sz="2400" dirty="0" smtClean="0"/>
-              <a:t>Web Applications</a:t>
+              <a:t>Module 15: Handling Requests in ASP.NET MVC Core Web Applications</a:t>
             </a:r>
           </a:p>
           <a:p>
@@ -4311,15 +4252,7 @@
             </a:pPr>
             <a:r>
               <a:rPr lang="en-US" sz="2400" dirty="0" smtClean="0"/>
-              <a:t>Module 16: Deploying ASP.NET MVC </a:t>
-            </a:r>
-            <a:r>
-              <a:rPr lang="en-US" sz="2400" dirty="0" smtClean="0"/>
-              <a:t>Core </a:t>
-            </a:r>
-            <a:r>
-              <a:rPr lang="en-US" sz="2400" dirty="0" smtClean="0"/>
-              <a:t>Web Applications</a:t>
+              <a:t>Module 16: Deploying ASP.NET MVC Core Web Applications</a:t>
             </a:r>
           </a:p>
           <a:p>
@@ -4816,19 +4749,7 @@
             </a:pPr>
             <a:r>
               <a:rPr lang="en-US" sz="2200" dirty="0" smtClean="0"/>
-              <a:t>By working through the labs, you will learn how to develop ASP.NET MVC </a:t>
-            </a:r>
-            <a:r>
-              <a:rPr lang="en-US" sz="2200" dirty="0" smtClean="0"/>
-              <a:t>Core </a:t>
-            </a:r>
-            <a:r>
-              <a:rPr lang="en-US" sz="2200" dirty="0" smtClean="0"/>
-              <a:t>web application that will help Adventure Works achieve its business goals</a:t>
-            </a:r>
-            <a:r>
-              <a:rPr lang="en-US" sz="2200" dirty="0" smtClean="0"/>
-              <a:t>.</a:t>
+              <a:t>By working through the labs, you will learn how to develop ASP.NET MVC Core web application that will help Adventure Works achieve its business goals.</a:t>
             </a:r>
           </a:p>
           <a:p>
@@ -4843,11 +4764,7 @@
             </a:pPr>
             <a:r>
               <a:rPr lang="en-US" sz="2200" dirty="0" smtClean="0"/>
-              <a:t>Each Lab is contained in a folder named after </a:t>
-            </a:r>
-            <a:r>
-              <a:rPr lang="en-US" sz="2200" dirty="0" smtClean="0"/>
-              <a:t>each chapter.</a:t>
+              <a:t>Each Lab is contained in a folder named after each chapter.</a:t>
             </a:r>
           </a:p>
           <a:p>
@@ -5423,17 +5340,12 @@
             <a:pPr lvl="2"/>
             <a:r>
               <a:rPr lang="en-US" sz="1600" dirty="0" smtClean="0"/>
-              <a:t>Describe the Microsoft Web Technologies </a:t>
-            </a:r>
-            <a:r>
-              <a:rPr lang="en-US" sz="1600" dirty="0" smtClean="0"/>
-              <a:t>stack</a:t>
+              <a:t>Describe the Microsoft Web Technologies stack</a:t>
             </a:r>
             <a:r>
               <a:rPr lang="en-CA" sz="1600" dirty="0" smtClean="0"/>
               <a:t>.</a:t>
             </a:r>
-            <a:endParaRPr lang="en-CA" sz="1600" dirty="0" smtClean="0"/>
           </a:p>
           <a:p>
             <a:pPr lvl="2"/>
@@ -5467,13 +5379,8 @@
             <a:pPr lvl="2"/>
             <a:r>
               <a:rPr lang="en-US" sz="1600" dirty="0" smtClean="0"/>
-              <a:t>Run unit tests and debugging tools against a web application in Visual </a:t>
-            </a:r>
-            <a:r>
-              <a:rPr lang="en-US" sz="1600" dirty="0" smtClean="0"/>
-              <a:t>Studio.</a:t>
-            </a:r>
-            <a:endParaRPr lang="en-US" sz="1600" dirty="0" smtClean="0"/>
+              <a:t>Run unit tests and debugging tools against a web application in Visual Studio.</a:t>
+            </a:r>
           </a:p>
           <a:p>
             <a:pPr lvl="2"/>
@@ -5614,30 +5521,14 @@
             <a:pPr lvl="2"/>
             <a:r>
               <a:rPr lang="en-US" sz="1600" dirty="0" smtClean="0"/>
-              <a:t>Write JavaScript code that runs on the client-side </a:t>
-            </a:r>
+              <a:t>Write JavaScript code that runs on the client-side to optimize the responsiveness of an MVC web application.</a:t>
+            </a:r>
+          </a:p>
+          <a:p>
+            <a:pPr lvl="2"/>
             <a:r>
               <a:rPr lang="en-US" sz="1600" dirty="0" smtClean="0"/>
-              <a:t>to </a:t>
-            </a:r>
-            <a:r>
-              <a:rPr lang="en-US" sz="1600" dirty="0" smtClean="0"/>
-              <a:t>optimize the responsiveness of an MVC web application.</a:t>
-            </a:r>
-          </a:p>
-          <a:p>
-            <a:pPr lvl="2"/>
-            <a:r>
-              <a:rPr lang="en-US" sz="1600" dirty="0" smtClean="0"/>
-              <a:t>Implement a complete membership system in an MVC </a:t>
-            </a:r>
-            <a:r>
-              <a:rPr lang="en-US" sz="1600" dirty="0" smtClean="0"/>
-              <a:t>Core </a:t>
-            </a:r>
-            <a:r>
-              <a:rPr lang="en-US" sz="1600" dirty="0" smtClean="0"/>
-              <a:t>web application.</a:t>
+              <a:t>Implement a complete membership system in an MVC Core web application.</a:t>
             </a:r>
           </a:p>
           <a:p>
@@ -5672,19 +5563,7 @@
             <a:pPr lvl="2"/>
             <a:r>
               <a:rPr lang="en-US" sz="1600" dirty="0" smtClean="0"/>
-              <a:t>Describe </a:t>
-            </a:r>
-            <a:r>
-              <a:rPr lang="en-US" sz="1600" dirty="0" smtClean="0"/>
-              <a:t>how to package and deploy an ASP.NET MVC </a:t>
-            </a:r>
-            <a:r>
-              <a:rPr lang="en-US" sz="1600" dirty="0" smtClean="0"/>
-              <a:t>Core web </a:t>
-            </a:r>
-            <a:r>
-              <a:rPr lang="en-US" sz="1600" dirty="0" smtClean="0"/>
-              <a:t>application from a development computer to a web server for staging or production.</a:t>
+              <a:t>Describe how to package and deploy an ASP.NET MVC Core web application from a development computer to a web server for staging or production.</a:t>
             </a:r>
           </a:p>
           <a:p>
@@ -5784,30 +5663,14 @@
             <a:pPr lvl="1"/>
             <a:r>
               <a:rPr lang="en-US" sz="1600" dirty="0" smtClean="0"/>
-              <a:t>Plan the overall architecture, controllers, views, and models of the MVC </a:t>
-            </a:r>
+              <a:t>Plan the overall architecture, controllers, views, and models of the MVC Core web application.</a:t>
+            </a:r>
+          </a:p>
+          <a:p>
+            <a:pPr lvl="1"/>
             <a:r>
               <a:rPr lang="en-US" sz="1600" dirty="0" smtClean="0"/>
-              <a:t>Core </a:t>
-            </a:r>
-            <a:r>
-              <a:rPr lang="en-US" sz="1600" dirty="0" smtClean="0"/>
-              <a:t>web application.</a:t>
-            </a:r>
-          </a:p>
-          <a:p>
-            <a:pPr lvl="1"/>
-            <a:r>
-              <a:rPr lang="en-US" sz="1600" dirty="0" smtClean="0"/>
-              <a:t>Create Models, Controllers, and Views in MVC </a:t>
-            </a:r>
-            <a:r>
-              <a:rPr lang="en-US" sz="1600" dirty="0" smtClean="0"/>
-              <a:t>Core </a:t>
-            </a:r>
-            <a:r>
-              <a:rPr lang="en-US" sz="1600" dirty="0" smtClean="0"/>
-              <a:t>web application.</a:t>
+              <a:t>Create Models, Controllers, and Views in MVC Core web application.</a:t>
             </a:r>
           </a:p>
           <a:p>
@@ -5863,15 +5726,7 @@
             <a:pPr lvl="1"/>
             <a:r>
               <a:rPr lang="en-US" sz="1600" dirty="0" smtClean="0"/>
-              <a:t>Create </a:t>
-            </a:r>
-            <a:r>
-              <a:rPr lang="en-US" sz="1600" dirty="0" smtClean="0"/>
-              <a:t>Middleware to </a:t>
-            </a:r>
-            <a:r>
-              <a:rPr lang="en-US" sz="1600" dirty="0" smtClean="0"/>
-              <a:t>handle requests.</a:t>
+              <a:t>Create Middleware to handle requests.</a:t>
             </a:r>
           </a:p>
           <a:p>
@@ -6044,11 +5899,6 @@
               </a:rPr>
               <a:t>Digital Material</a:t>
             </a:r>
-            <a:endParaRPr lang="en-US" sz="2000" b="1" dirty="0" smtClean="0">
-              <a:solidFill>
-                <a:srgbClr val="0070C0"/>
-              </a:solidFill>
-            </a:endParaRPr>
           </a:p>
           <a:p>
             <a:pPr marL="560070" indent="-285750"/>
@@ -6061,11 +5911,7 @@
             <a:pPr marL="560070" indent="-285750"/>
             <a:r>
               <a:rPr lang="en-US" sz="1800" dirty="0" smtClean="0"/>
-              <a:t>Includes Labs + Lab </a:t>
-            </a:r>
-            <a:r>
-              <a:rPr lang="en-US" sz="1800" dirty="0" smtClean="0"/>
-              <a:t>Solutions</a:t>
+              <a:t>Includes Labs + Lab Solutions</a:t>
             </a:r>
             <a:endParaRPr lang="en-US" sz="1800" dirty="0"/>
           </a:p>
@@ -6213,11 +6059,7 @@
             </a:pPr>
             <a:r>
               <a:rPr lang="en-US" sz="2400" dirty="0" smtClean="0"/>
-              <a:t>Module 1: Exploring ASP.NET MVC </a:t>
-            </a:r>
-            <a:r>
-              <a:rPr lang="en-US" sz="2400" dirty="0" smtClean="0"/>
-              <a:t>Core</a:t>
+              <a:t>Module 1: Exploring ASP.NET MVC Core</a:t>
             </a:r>
             <a:endParaRPr lang="en-US" sz="2400" dirty="0"/>
           </a:p>
@@ -6229,15 +6071,7 @@
             </a:pPr>
             <a:r>
               <a:rPr lang="en-US" sz="2400" dirty="0" smtClean="0"/>
-              <a:t>Module 2: Designing ASP.NET MVC </a:t>
-            </a:r>
-            <a:r>
-              <a:rPr lang="en-US" sz="2400" dirty="0" smtClean="0"/>
-              <a:t>Core </a:t>
-            </a:r>
-            <a:r>
-              <a:rPr lang="en-US" sz="2400" dirty="0" smtClean="0"/>
-              <a:t>Web Applications</a:t>
+              <a:t>Module 2: Designing ASP.NET MVC Core Web Applications</a:t>
             </a:r>
             <a:endParaRPr lang="en-US" sz="2400" dirty="0"/>
           </a:p>
@@ -6249,15 +6083,7 @@
             </a:pPr>
             <a:r>
               <a:rPr lang="en-US" sz="2400" dirty="0" smtClean="0"/>
-              <a:t>Module 3: Developing ASP.NET MVC </a:t>
-            </a:r>
-            <a:r>
-              <a:rPr lang="en-US" sz="2400" dirty="0" smtClean="0"/>
-              <a:t>Core </a:t>
-            </a:r>
-            <a:r>
-              <a:rPr lang="en-US" sz="2400" dirty="0" smtClean="0"/>
-              <a:t>Models</a:t>
+              <a:t>Module 3: Developing ASP.NET MVC Core Models</a:t>
             </a:r>
             <a:endParaRPr lang="en-US" sz="2400" dirty="0"/>
           </a:p>
@@ -6269,15 +6095,7 @@
             </a:pPr>
             <a:r>
               <a:rPr lang="en-US" sz="2400" dirty="0" smtClean="0"/>
-              <a:t>Module 4: Developing ASP.NET MVC </a:t>
-            </a:r>
-            <a:r>
-              <a:rPr lang="en-US" sz="2400" dirty="0" smtClean="0"/>
-              <a:t>Core </a:t>
-            </a:r>
-            <a:r>
-              <a:rPr lang="en-US" sz="2400" dirty="0" smtClean="0"/>
-              <a:t>Controllers</a:t>
+              <a:t>Module 4: Developing ASP.NET MVC Core Controllers</a:t>
             </a:r>
             <a:endParaRPr lang="en-US" sz="2400" dirty="0"/>
           </a:p>
@@ -6297,15 +6115,7 @@
             </a:r>
             <a:r>
               <a:rPr lang="en-US" sz="2400" dirty="0" smtClean="0"/>
-              <a:t>: Developing ASP.NET MVC </a:t>
-            </a:r>
-            <a:r>
-              <a:rPr lang="en-US" sz="2400" dirty="0" smtClean="0"/>
-              <a:t>Core </a:t>
-            </a:r>
-            <a:r>
-              <a:rPr lang="en-US" sz="2400" dirty="0" smtClean="0"/>
-              <a:t>Views</a:t>
+              <a:t>: Developing ASP.NET MVC Core Views</a:t>
             </a:r>
             <a:endParaRPr lang="en-US" sz="2400" dirty="0"/>
           </a:p>
@@ -6317,15 +6127,7 @@
             </a:pPr>
             <a:r>
               <a:rPr lang="en-US" sz="2400" dirty="0" smtClean="0"/>
-              <a:t>Module 6: Testing and Debugging ASP.NET MVC </a:t>
-            </a:r>
-            <a:r>
-              <a:rPr lang="en-US" sz="2400" dirty="0" smtClean="0"/>
-              <a:t>Core </a:t>
-            </a:r>
-            <a:r>
-              <a:rPr lang="en-US" sz="2400" dirty="0" smtClean="0"/>
-              <a:t>Web Applications</a:t>
+              <a:t>Module 6: Testing and Debugging ASP.NET MVC Core Web Applications</a:t>
             </a:r>
             <a:endParaRPr lang="en-US" sz="2400" dirty="0"/>
           </a:p>
@@ -6337,15 +6139,7 @@
             </a:pPr>
             <a:r>
               <a:rPr lang="en-US" sz="2400" dirty="0" smtClean="0"/>
-              <a:t>Module 7: Structuring ASP.NET MVC </a:t>
-            </a:r>
-            <a:r>
-              <a:rPr lang="en-US" sz="2400" dirty="0" smtClean="0"/>
-              <a:t>Core </a:t>
-            </a:r>
-            <a:r>
-              <a:rPr lang="en-US" sz="2400" dirty="0" smtClean="0"/>
-              <a:t>Web Applications</a:t>
+              <a:t>Module 7: Structuring ASP.NET MVC Core Web Applications</a:t>
             </a:r>
             <a:endParaRPr lang="en-US" sz="2400" dirty="0"/>
           </a:p>
@@ -6361,15 +6155,7 @@
             </a:r>
             <a:r>
               <a:rPr lang="en-US" sz="2400" dirty="0" smtClean="0"/>
-              <a:t>8: Applying Styles to ASP.NET MVC </a:t>
-            </a:r>
-            <a:r>
-              <a:rPr lang="en-US" sz="2400" dirty="0" smtClean="0"/>
-              <a:t>Core </a:t>
-            </a:r>
-            <a:r>
-              <a:rPr lang="en-US" sz="2400" dirty="0" smtClean="0"/>
-              <a:t>Web Applications</a:t>
+              <a:t>8: Applying Styles to ASP.NET MVC Core Web Applications</a:t>
             </a:r>
             <a:endParaRPr lang="en-US" sz="2400" dirty="0"/>
           </a:p>

</xml_diff>